<commit_message>
Amelioration des page HTML, utilisation du Script.js, création de la chart graphique pour 2 template
</commit_message>
<xml_diff>
--- a/Document/Cadrage/Chart graphique.pptx
+++ b/Document/Cadrage/Chart graphique.pptx
@@ -6,6 +6,7 @@
   </p:sldMasterIdLst>
   <p:sldIdLst>
     <p:sldId id="256" r:id="rId2"/>
+    <p:sldId id="257" r:id="rId3"/>
   </p:sldIdLst>
   <p:sldSz cx="9144000" cy="6858000" type="screen4x3"/>
   <p:notesSz cx="6858000" cy="9144000"/>
@@ -3082,10 +3083,10 @@
           <a:lstStyle/>
           <a:p>
             <a:r>
-              <a:rPr lang="fr-FR" dirty="0" smtClean="0"/>
+              <a:rPr lang="fr-FR" b="1" dirty="0" smtClean="0"/>
               <a:t>Chromatique:</a:t>
             </a:r>
-            <a:endParaRPr lang="fr-FR" dirty="0"/>
+            <a:endParaRPr lang="fr-FR" b="1" dirty="0"/>
           </a:p>
         </p:txBody>
       </p:sp>
@@ -3103,6 +3104,9 @@
           <a:prstGeom prst="rect">
             <a:avLst/>
           </a:prstGeom>
+          <a:solidFill>
+            <a:srgbClr val="F7F1CF"/>
+          </a:solidFill>
           <a:ln/>
         </p:spPr>
         <p:style>
@@ -3124,7 +3128,956 @@
           <a:lstStyle/>
           <a:p>
             <a:pPr algn="ctr"/>
-            <a:endParaRPr lang="fr-FR"/>
+            <a:endParaRPr lang="fr-FR" dirty="0"/>
+          </a:p>
+        </p:txBody>
+      </p:sp>
+      <p:sp>
+        <p:nvSpPr>
+          <p:cNvPr id="6" name="Rectangle 5"/>
+          <p:cNvSpPr/>
+          <p:nvPr/>
+        </p:nvSpPr>
+        <p:spPr>
+          <a:xfrm>
+            <a:off x="1071538" y="3000372"/>
+            <a:ext cx="642942" cy="500066"/>
+          </a:xfrm>
+          <a:prstGeom prst="rect">
+            <a:avLst/>
+          </a:prstGeom>
+          <a:solidFill>
+            <a:srgbClr val="E9C100"/>
+          </a:solidFill>
+          <a:ln/>
+        </p:spPr>
+        <p:style>
+          <a:lnRef idx="2">
+            <a:schemeClr val="dk1"/>
+          </a:lnRef>
+          <a:fillRef idx="1">
+            <a:schemeClr val="lt1"/>
+          </a:fillRef>
+          <a:effectRef idx="0">
+            <a:schemeClr val="dk1"/>
+          </a:effectRef>
+          <a:fontRef idx="minor">
+            <a:schemeClr val="dk1"/>
+          </a:fontRef>
+        </p:style>
+        <p:txBody>
+          <a:bodyPr rtlCol="0" anchor="ctr"/>
+          <a:lstStyle/>
+          <a:p>
+            <a:pPr algn="ctr"/>
+            <a:endParaRPr lang="fr-FR" dirty="0"/>
+          </a:p>
+        </p:txBody>
+      </p:sp>
+      <p:sp>
+        <p:nvSpPr>
+          <p:cNvPr id="7" name="Rectangle 6"/>
+          <p:cNvSpPr/>
+          <p:nvPr/>
+        </p:nvSpPr>
+        <p:spPr>
+          <a:xfrm>
+            <a:off x="1071538" y="3857628"/>
+            <a:ext cx="642942" cy="500066"/>
+          </a:xfrm>
+          <a:prstGeom prst="rect">
+            <a:avLst/>
+          </a:prstGeom>
+          <a:solidFill>
+            <a:srgbClr val="0B8457"/>
+          </a:solidFill>
+          <a:ln/>
+        </p:spPr>
+        <p:style>
+          <a:lnRef idx="2">
+            <a:schemeClr val="dk1"/>
+          </a:lnRef>
+          <a:fillRef idx="1">
+            <a:schemeClr val="lt1"/>
+          </a:fillRef>
+          <a:effectRef idx="0">
+            <a:schemeClr val="dk1"/>
+          </a:effectRef>
+          <a:fontRef idx="minor">
+            <a:schemeClr val="dk1"/>
+          </a:fontRef>
+        </p:style>
+        <p:txBody>
+          <a:bodyPr rtlCol="0" anchor="ctr"/>
+          <a:lstStyle/>
+          <a:p>
+            <a:pPr algn="ctr"/>
+            <a:endParaRPr lang="fr-FR" dirty="0"/>
+          </a:p>
+        </p:txBody>
+      </p:sp>
+      <p:sp>
+        <p:nvSpPr>
+          <p:cNvPr id="8" name="ZoneTexte 7"/>
+          <p:cNvSpPr txBox="1"/>
+          <p:nvPr/>
+        </p:nvSpPr>
+        <p:spPr>
+          <a:xfrm>
+            <a:off x="1714480" y="2143116"/>
+            <a:ext cx="3143272" cy="307777"/>
+          </a:xfrm>
+          <a:prstGeom prst="rect">
+            <a:avLst/>
+          </a:prstGeom>
+          <a:noFill/>
+        </p:spPr>
+        <p:txBody>
+          <a:bodyPr wrap="square" rtlCol="0">
+            <a:spAutoFit/>
+          </a:bodyPr>
+          <a:lstStyle/>
+          <a:p>
+            <a:r>
+              <a:rPr lang="fr-FR" sz="1400" dirty="0" smtClean="0"/>
+              <a:t>Couleur primaire :</a:t>
+            </a:r>
+            <a:endParaRPr lang="fr-FR" sz="1400" dirty="0"/>
+          </a:p>
+        </p:txBody>
+      </p:sp>
+      <p:sp>
+        <p:nvSpPr>
+          <p:cNvPr id="9" name="ZoneTexte 8"/>
+          <p:cNvSpPr txBox="1"/>
+          <p:nvPr/>
+        </p:nvSpPr>
+        <p:spPr>
+          <a:xfrm>
+            <a:off x="2000232" y="2428868"/>
+            <a:ext cx="3143272" cy="253916"/>
+          </a:xfrm>
+          <a:prstGeom prst="rect">
+            <a:avLst/>
+          </a:prstGeom>
+          <a:noFill/>
+        </p:spPr>
+        <p:txBody>
+          <a:bodyPr wrap="square" rtlCol="0">
+            <a:spAutoFit/>
+          </a:bodyPr>
+          <a:lstStyle/>
+          <a:p>
+            <a:r>
+              <a:rPr lang="fr-FR" sz="1050" dirty="0" err="1" smtClean="0"/>
+              <a:t>Hex</a:t>
+            </a:r>
+            <a:r>
+              <a:rPr lang="fr-FR" sz="1050" dirty="0" smtClean="0"/>
+              <a:t> : F8F1D0  </a:t>
+            </a:r>
+            <a:endParaRPr lang="fr-FR" sz="1050" dirty="0"/>
+          </a:p>
+        </p:txBody>
+      </p:sp>
+      <p:sp>
+        <p:nvSpPr>
+          <p:cNvPr id="10" name="ZoneTexte 9"/>
+          <p:cNvSpPr txBox="1"/>
+          <p:nvPr/>
+        </p:nvSpPr>
+        <p:spPr>
+          <a:xfrm>
+            <a:off x="1714480" y="3000372"/>
+            <a:ext cx="3143272" cy="307777"/>
+          </a:xfrm>
+          <a:prstGeom prst="rect">
+            <a:avLst/>
+          </a:prstGeom>
+          <a:noFill/>
+        </p:spPr>
+        <p:txBody>
+          <a:bodyPr wrap="square" rtlCol="0">
+            <a:spAutoFit/>
+          </a:bodyPr>
+          <a:lstStyle/>
+          <a:p>
+            <a:r>
+              <a:rPr lang="fr-FR" sz="1400" dirty="0" smtClean="0"/>
+              <a:t>Couleur secondaire:</a:t>
+            </a:r>
+            <a:endParaRPr lang="fr-FR" sz="1400" dirty="0"/>
+          </a:p>
+        </p:txBody>
+      </p:sp>
+      <p:sp>
+        <p:nvSpPr>
+          <p:cNvPr id="11" name="ZoneTexte 10"/>
+          <p:cNvSpPr txBox="1"/>
+          <p:nvPr/>
+        </p:nvSpPr>
+        <p:spPr>
+          <a:xfrm>
+            <a:off x="2000232" y="3286124"/>
+            <a:ext cx="3143272" cy="253916"/>
+          </a:xfrm>
+          <a:prstGeom prst="rect">
+            <a:avLst/>
+          </a:prstGeom>
+          <a:noFill/>
+        </p:spPr>
+        <p:txBody>
+          <a:bodyPr wrap="square" rtlCol="0">
+            <a:spAutoFit/>
+          </a:bodyPr>
+          <a:lstStyle/>
+          <a:p>
+            <a:r>
+              <a:rPr lang="fr-FR" sz="1050" dirty="0" err="1" smtClean="0"/>
+              <a:t>Hex</a:t>
+            </a:r>
+            <a:r>
+              <a:rPr lang="fr-FR" sz="1050" dirty="0" smtClean="0"/>
+              <a:t> : </a:t>
+            </a:r>
+            <a:r>
+              <a:rPr lang="fr-FR" sz="1050" dirty="0" smtClean="0"/>
+              <a:t>e0bf22</a:t>
+            </a:r>
+            <a:endParaRPr lang="fr-FR" sz="1050" dirty="0"/>
+          </a:p>
+        </p:txBody>
+      </p:sp>
+      <p:sp>
+        <p:nvSpPr>
+          <p:cNvPr id="12" name="ZoneTexte 11"/>
+          <p:cNvSpPr txBox="1"/>
+          <p:nvPr/>
+        </p:nvSpPr>
+        <p:spPr>
+          <a:xfrm>
+            <a:off x="1714480" y="3857628"/>
+            <a:ext cx="3143272" cy="307777"/>
+          </a:xfrm>
+          <a:prstGeom prst="rect">
+            <a:avLst/>
+          </a:prstGeom>
+          <a:noFill/>
+        </p:spPr>
+        <p:txBody>
+          <a:bodyPr wrap="square" rtlCol="0">
+            <a:spAutoFit/>
+          </a:bodyPr>
+          <a:lstStyle/>
+          <a:p>
+            <a:r>
+              <a:rPr lang="fr-FR" sz="1400" dirty="0" smtClean="0"/>
+              <a:t>Couleur détail:</a:t>
+            </a:r>
+            <a:endParaRPr lang="fr-FR" sz="1400" dirty="0"/>
+          </a:p>
+        </p:txBody>
+      </p:sp>
+      <p:sp>
+        <p:nvSpPr>
+          <p:cNvPr id="13" name="ZoneTexte 12"/>
+          <p:cNvSpPr txBox="1"/>
+          <p:nvPr/>
+        </p:nvSpPr>
+        <p:spPr>
+          <a:xfrm>
+            <a:off x="2000232" y="4143380"/>
+            <a:ext cx="3143272" cy="253916"/>
+          </a:xfrm>
+          <a:prstGeom prst="rect">
+            <a:avLst/>
+          </a:prstGeom>
+          <a:noFill/>
+        </p:spPr>
+        <p:txBody>
+          <a:bodyPr wrap="square" rtlCol="0">
+            <a:spAutoFit/>
+          </a:bodyPr>
+          <a:lstStyle/>
+          <a:p>
+            <a:r>
+              <a:rPr lang="fr-FR" sz="1050" dirty="0" err="1" smtClean="0"/>
+              <a:t>Hex</a:t>
+            </a:r>
+            <a:r>
+              <a:rPr lang="fr-FR" sz="1050" dirty="0" smtClean="0"/>
+              <a:t> : </a:t>
+            </a:r>
+            <a:r>
+              <a:rPr lang="fr-FR" sz="1050" dirty="0" smtClean="0"/>
+              <a:t>0b8457</a:t>
+            </a:r>
+            <a:endParaRPr lang="fr-FR" sz="1050" dirty="0"/>
+          </a:p>
+        </p:txBody>
+      </p:sp>
+      <p:sp>
+        <p:nvSpPr>
+          <p:cNvPr id="14" name="ZoneTexte 13"/>
+          <p:cNvSpPr txBox="1"/>
+          <p:nvPr/>
+        </p:nvSpPr>
+        <p:spPr>
+          <a:xfrm>
+            <a:off x="571472" y="857232"/>
+            <a:ext cx="5715040" cy="307777"/>
+          </a:xfrm>
+          <a:prstGeom prst="rect">
+            <a:avLst/>
+          </a:prstGeom>
+          <a:noFill/>
+        </p:spPr>
+        <p:txBody>
+          <a:bodyPr wrap="square" rtlCol="0">
+            <a:spAutoFit/>
+          </a:bodyPr>
+          <a:lstStyle/>
+          <a:p>
+            <a:r>
+              <a:rPr lang="fr-FR" sz="1400" b="1" dirty="0" smtClean="0"/>
+              <a:t>Template </a:t>
+            </a:r>
+            <a:r>
+              <a:rPr lang="fr-FR" sz="1400" b="1" dirty="0" smtClean="0"/>
+              <a:t>par </a:t>
+            </a:r>
+            <a:r>
+              <a:rPr lang="fr-FR" sz="1400" b="1" dirty="0" err="1" smtClean="0"/>
+              <a:t>défault</a:t>
+            </a:r>
+            <a:r>
+              <a:rPr lang="fr-FR" sz="1400" b="1" dirty="0" smtClean="0"/>
+              <a:t>:</a:t>
+            </a:r>
+            <a:endParaRPr lang="fr-FR" sz="1400" b="1" dirty="0"/>
+          </a:p>
+        </p:txBody>
+      </p:sp>
+      <p:sp>
+        <p:nvSpPr>
+          <p:cNvPr id="15" name="Rectangle 14"/>
+          <p:cNvSpPr/>
+          <p:nvPr/>
+        </p:nvSpPr>
+        <p:spPr>
+          <a:xfrm>
+            <a:off x="1071538" y="4714884"/>
+            <a:ext cx="642942" cy="500066"/>
+          </a:xfrm>
+          <a:prstGeom prst="rect">
+            <a:avLst/>
+          </a:prstGeom>
+          <a:solidFill>
+            <a:srgbClr val="096C46"/>
+          </a:solidFill>
+          <a:ln/>
+        </p:spPr>
+        <p:style>
+          <a:lnRef idx="2">
+            <a:schemeClr val="dk1"/>
+          </a:lnRef>
+          <a:fillRef idx="1">
+            <a:schemeClr val="lt1"/>
+          </a:fillRef>
+          <a:effectRef idx="0">
+            <a:schemeClr val="dk1"/>
+          </a:effectRef>
+          <a:fontRef idx="minor">
+            <a:schemeClr val="dk1"/>
+          </a:fontRef>
+        </p:style>
+        <p:txBody>
+          <a:bodyPr rtlCol="0" anchor="ctr"/>
+          <a:lstStyle/>
+          <a:p>
+            <a:pPr algn="ctr"/>
+            <a:endParaRPr lang="fr-FR" dirty="0"/>
+          </a:p>
+        </p:txBody>
+      </p:sp>
+      <p:sp>
+        <p:nvSpPr>
+          <p:cNvPr id="16" name="ZoneTexte 15"/>
+          <p:cNvSpPr txBox="1"/>
+          <p:nvPr/>
+        </p:nvSpPr>
+        <p:spPr>
+          <a:xfrm>
+            <a:off x="1714480" y="4714884"/>
+            <a:ext cx="3143272" cy="307777"/>
+          </a:xfrm>
+          <a:prstGeom prst="rect">
+            <a:avLst/>
+          </a:prstGeom>
+          <a:noFill/>
+        </p:spPr>
+        <p:txBody>
+          <a:bodyPr wrap="square" rtlCol="0">
+            <a:spAutoFit/>
+          </a:bodyPr>
+          <a:lstStyle/>
+          <a:p>
+            <a:r>
+              <a:rPr lang="fr-FR" sz="1400" dirty="0" smtClean="0"/>
+              <a:t>Couleur 2éme détail:</a:t>
+            </a:r>
+            <a:endParaRPr lang="fr-FR" sz="1400" dirty="0"/>
+          </a:p>
+        </p:txBody>
+      </p:sp>
+      <p:sp>
+        <p:nvSpPr>
+          <p:cNvPr id="17" name="ZoneTexte 16"/>
+          <p:cNvSpPr txBox="1"/>
+          <p:nvPr/>
+        </p:nvSpPr>
+        <p:spPr>
+          <a:xfrm>
+            <a:off x="2000232" y="5000636"/>
+            <a:ext cx="3143272" cy="253916"/>
+          </a:xfrm>
+          <a:prstGeom prst="rect">
+            <a:avLst/>
+          </a:prstGeom>
+          <a:noFill/>
+        </p:spPr>
+        <p:txBody>
+          <a:bodyPr wrap="square" rtlCol="0">
+            <a:spAutoFit/>
+          </a:bodyPr>
+          <a:lstStyle/>
+          <a:p>
+            <a:r>
+              <a:rPr lang="fr-FR" sz="1050" dirty="0" err="1" smtClean="0"/>
+              <a:t>Hex</a:t>
+            </a:r>
+            <a:r>
+              <a:rPr lang="fr-FR" sz="1050" dirty="0" smtClean="0"/>
+              <a:t> : </a:t>
+            </a:r>
+            <a:r>
+              <a:rPr lang="fr-FR" sz="1050" dirty="0" smtClean="0"/>
+              <a:t>096c46</a:t>
+            </a:r>
+            <a:endParaRPr lang="fr-FR" sz="1050" dirty="0"/>
+          </a:p>
+        </p:txBody>
+      </p:sp>
+    </p:spTree>
+  </p:cSld>
+  <p:clrMapOvr>
+    <a:masterClrMapping/>
+  </p:clrMapOvr>
+</p:sld>
+</file>
+
+<file path=ppt/slides/slide2.xml><?xml version="1.0" encoding="utf-8"?>
+<p:sld xmlns:a="http://schemas.openxmlformats.org/drawingml/2006/main" xmlns:r="http://schemas.openxmlformats.org/officeDocument/2006/relationships" xmlns:p="http://schemas.openxmlformats.org/presentationml/2006/main">
+  <p:cSld>
+    <p:spTree>
+      <p:nvGrpSpPr>
+        <p:cNvPr id="1" name=""/>
+        <p:cNvGrpSpPr/>
+        <p:nvPr/>
+      </p:nvGrpSpPr>
+      <p:grpSpPr>
+        <a:xfrm>
+          <a:off x="0" y="0"/>
+          <a:ext cx="0" cy="0"/>
+          <a:chOff x="0" y="0"/>
+          <a:chExt cx="0" cy="0"/>
+        </a:xfrm>
+      </p:grpSpPr>
+      <p:sp>
+        <p:nvSpPr>
+          <p:cNvPr id="4" name="ZoneTexte 3"/>
+          <p:cNvSpPr txBox="1"/>
+          <p:nvPr/>
+        </p:nvSpPr>
+        <p:spPr>
+          <a:xfrm>
+            <a:off x="285720" y="357166"/>
+            <a:ext cx="5715040" cy="369332"/>
+          </a:xfrm>
+          <a:prstGeom prst="rect">
+            <a:avLst/>
+          </a:prstGeom>
+          <a:noFill/>
+        </p:spPr>
+        <p:txBody>
+          <a:bodyPr wrap="square" rtlCol="0">
+            <a:spAutoFit/>
+          </a:bodyPr>
+          <a:lstStyle/>
+          <a:p>
+            <a:r>
+              <a:rPr lang="fr-FR" b="1" dirty="0" smtClean="0"/>
+              <a:t>Chromatique:</a:t>
+            </a:r>
+            <a:endParaRPr lang="fr-FR" b="1" dirty="0"/>
+          </a:p>
+        </p:txBody>
+      </p:sp>
+      <p:sp>
+        <p:nvSpPr>
+          <p:cNvPr id="5" name="Rectangle 4"/>
+          <p:cNvSpPr/>
+          <p:nvPr/>
+        </p:nvSpPr>
+        <p:spPr>
+          <a:xfrm>
+            <a:off x="1071538" y="2143116"/>
+            <a:ext cx="642942" cy="500066"/>
+          </a:xfrm>
+          <a:prstGeom prst="rect">
+            <a:avLst/>
+          </a:prstGeom>
+          <a:solidFill>
+            <a:srgbClr val="F8F8F8"/>
+          </a:solidFill>
+          <a:ln/>
+        </p:spPr>
+        <p:style>
+          <a:lnRef idx="2">
+            <a:schemeClr val="dk1"/>
+          </a:lnRef>
+          <a:fillRef idx="1">
+            <a:schemeClr val="lt1"/>
+          </a:fillRef>
+          <a:effectRef idx="0">
+            <a:schemeClr val="dk1"/>
+          </a:effectRef>
+          <a:fontRef idx="minor">
+            <a:schemeClr val="dk1"/>
+          </a:fontRef>
+        </p:style>
+        <p:txBody>
+          <a:bodyPr rtlCol="0" anchor="ctr"/>
+          <a:lstStyle/>
+          <a:p>
+            <a:pPr algn="ctr"/>
+            <a:endParaRPr lang="fr-FR" dirty="0"/>
+          </a:p>
+        </p:txBody>
+      </p:sp>
+      <p:sp>
+        <p:nvSpPr>
+          <p:cNvPr id="6" name="Rectangle 5"/>
+          <p:cNvSpPr/>
+          <p:nvPr/>
+        </p:nvSpPr>
+        <p:spPr>
+          <a:xfrm>
+            <a:off x="1071538" y="3000372"/>
+            <a:ext cx="642942" cy="500066"/>
+          </a:xfrm>
+          <a:prstGeom prst="rect">
+            <a:avLst/>
+          </a:prstGeom>
+          <a:solidFill>
+            <a:srgbClr val="A9C530"/>
+          </a:solidFill>
+          <a:ln/>
+        </p:spPr>
+        <p:style>
+          <a:lnRef idx="2">
+            <a:schemeClr val="dk1"/>
+          </a:lnRef>
+          <a:fillRef idx="1">
+            <a:schemeClr val="lt1"/>
+          </a:fillRef>
+          <a:effectRef idx="0">
+            <a:schemeClr val="dk1"/>
+          </a:effectRef>
+          <a:fontRef idx="minor">
+            <a:schemeClr val="dk1"/>
+          </a:fontRef>
+        </p:style>
+        <p:txBody>
+          <a:bodyPr rtlCol="0" anchor="ctr"/>
+          <a:lstStyle/>
+          <a:p>
+            <a:pPr algn="ctr"/>
+            <a:endParaRPr lang="fr-FR" dirty="0"/>
+          </a:p>
+        </p:txBody>
+      </p:sp>
+      <p:sp>
+        <p:nvSpPr>
+          <p:cNvPr id="7" name="Rectangle 6"/>
+          <p:cNvSpPr/>
+          <p:nvPr/>
+        </p:nvSpPr>
+        <p:spPr>
+          <a:xfrm>
+            <a:off x="1071538" y="3857628"/>
+            <a:ext cx="642942" cy="500066"/>
+          </a:xfrm>
+          <a:prstGeom prst="rect">
+            <a:avLst/>
+          </a:prstGeom>
+          <a:solidFill>
+            <a:srgbClr val="2C5D62"/>
+          </a:solidFill>
+          <a:ln/>
+        </p:spPr>
+        <p:style>
+          <a:lnRef idx="2">
+            <a:schemeClr val="dk1"/>
+          </a:lnRef>
+          <a:fillRef idx="1">
+            <a:schemeClr val="lt1"/>
+          </a:fillRef>
+          <a:effectRef idx="0">
+            <a:schemeClr val="dk1"/>
+          </a:effectRef>
+          <a:fontRef idx="minor">
+            <a:schemeClr val="dk1"/>
+          </a:fontRef>
+        </p:style>
+        <p:txBody>
+          <a:bodyPr rtlCol="0" anchor="ctr"/>
+          <a:lstStyle/>
+          <a:p>
+            <a:pPr algn="ctr"/>
+            <a:endParaRPr lang="fr-FR" dirty="0"/>
+          </a:p>
+        </p:txBody>
+      </p:sp>
+      <p:sp>
+        <p:nvSpPr>
+          <p:cNvPr id="8" name="ZoneTexte 7"/>
+          <p:cNvSpPr txBox="1"/>
+          <p:nvPr/>
+        </p:nvSpPr>
+        <p:spPr>
+          <a:xfrm>
+            <a:off x="1714480" y="2143116"/>
+            <a:ext cx="3143272" cy="307777"/>
+          </a:xfrm>
+          <a:prstGeom prst="rect">
+            <a:avLst/>
+          </a:prstGeom>
+          <a:noFill/>
+        </p:spPr>
+        <p:txBody>
+          <a:bodyPr wrap="square" rtlCol="0">
+            <a:spAutoFit/>
+          </a:bodyPr>
+          <a:lstStyle/>
+          <a:p>
+            <a:r>
+              <a:rPr lang="fr-FR" sz="1400" dirty="0" smtClean="0"/>
+              <a:t>Couleur primaire :</a:t>
+            </a:r>
+            <a:endParaRPr lang="fr-FR" sz="1400" dirty="0"/>
+          </a:p>
+        </p:txBody>
+      </p:sp>
+      <p:sp>
+        <p:nvSpPr>
+          <p:cNvPr id="9" name="ZoneTexte 8"/>
+          <p:cNvSpPr txBox="1"/>
+          <p:nvPr/>
+        </p:nvSpPr>
+        <p:spPr>
+          <a:xfrm>
+            <a:off x="2000232" y="2428868"/>
+            <a:ext cx="3143272" cy="253916"/>
+          </a:xfrm>
+          <a:prstGeom prst="rect">
+            <a:avLst/>
+          </a:prstGeom>
+          <a:noFill/>
+        </p:spPr>
+        <p:txBody>
+          <a:bodyPr wrap="square" rtlCol="0">
+            <a:spAutoFit/>
+          </a:bodyPr>
+          <a:lstStyle/>
+          <a:p>
+            <a:r>
+              <a:rPr lang="fr-FR" sz="1050" dirty="0" err="1" smtClean="0"/>
+              <a:t>Hex</a:t>
+            </a:r>
+            <a:r>
+              <a:rPr lang="fr-FR" sz="1050" dirty="0" smtClean="0"/>
+              <a:t> : F5F5F5</a:t>
+            </a:r>
+            <a:endParaRPr lang="fr-FR" sz="1050" dirty="0"/>
+          </a:p>
+        </p:txBody>
+      </p:sp>
+      <p:sp>
+        <p:nvSpPr>
+          <p:cNvPr id="10" name="ZoneTexte 9"/>
+          <p:cNvSpPr txBox="1"/>
+          <p:nvPr/>
+        </p:nvSpPr>
+        <p:spPr>
+          <a:xfrm>
+            <a:off x="1714480" y="3000372"/>
+            <a:ext cx="3143272" cy="307777"/>
+          </a:xfrm>
+          <a:prstGeom prst="rect">
+            <a:avLst/>
+          </a:prstGeom>
+          <a:noFill/>
+        </p:spPr>
+        <p:txBody>
+          <a:bodyPr wrap="square" rtlCol="0">
+            <a:spAutoFit/>
+          </a:bodyPr>
+          <a:lstStyle/>
+          <a:p>
+            <a:r>
+              <a:rPr lang="fr-FR" sz="1400" dirty="0" smtClean="0"/>
+              <a:t>Couleur secondaire:</a:t>
+            </a:r>
+            <a:endParaRPr lang="fr-FR" sz="1400" dirty="0"/>
+          </a:p>
+        </p:txBody>
+      </p:sp>
+      <p:sp>
+        <p:nvSpPr>
+          <p:cNvPr id="11" name="ZoneTexte 10"/>
+          <p:cNvSpPr txBox="1"/>
+          <p:nvPr/>
+        </p:nvSpPr>
+        <p:spPr>
+          <a:xfrm>
+            <a:off x="2000232" y="3286124"/>
+            <a:ext cx="3143272" cy="253916"/>
+          </a:xfrm>
+          <a:prstGeom prst="rect">
+            <a:avLst/>
+          </a:prstGeom>
+          <a:noFill/>
+        </p:spPr>
+        <p:txBody>
+          <a:bodyPr wrap="square" rtlCol="0">
+            <a:spAutoFit/>
+          </a:bodyPr>
+          <a:lstStyle/>
+          <a:p>
+            <a:r>
+              <a:rPr lang="fr-FR" sz="1050" dirty="0" err="1" smtClean="0"/>
+              <a:t>Hex</a:t>
+            </a:r>
+            <a:r>
+              <a:rPr lang="fr-FR" sz="1050" dirty="0" smtClean="0"/>
+              <a:t> : A9C52F</a:t>
+            </a:r>
+            <a:endParaRPr lang="fr-FR" sz="1050" dirty="0"/>
+          </a:p>
+        </p:txBody>
+      </p:sp>
+      <p:sp>
+        <p:nvSpPr>
+          <p:cNvPr id="12" name="ZoneTexte 11"/>
+          <p:cNvSpPr txBox="1"/>
+          <p:nvPr/>
+        </p:nvSpPr>
+        <p:spPr>
+          <a:xfrm>
+            <a:off x="1714480" y="3857628"/>
+            <a:ext cx="3143272" cy="307777"/>
+          </a:xfrm>
+          <a:prstGeom prst="rect">
+            <a:avLst/>
+          </a:prstGeom>
+          <a:noFill/>
+        </p:spPr>
+        <p:txBody>
+          <a:bodyPr wrap="square" rtlCol="0">
+            <a:spAutoFit/>
+          </a:bodyPr>
+          <a:lstStyle/>
+          <a:p>
+            <a:r>
+              <a:rPr lang="fr-FR" sz="1400" dirty="0" smtClean="0"/>
+              <a:t>Couleur détail:</a:t>
+            </a:r>
+            <a:endParaRPr lang="fr-FR" sz="1400" dirty="0"/>
+          </a:p>
+        </p:txBody>
+      </p:sp>
+      <p:sp>
+        <p:nvSpPr>
+          <p:cNvPr id="13" name="ZoneTexte 12"/>
+          <p:cNvSpPr txBox="1"/>
+          <p:nvPr/>
+        </p:nvSpPr>
+        <p:spPr>
+          <a:xfrm>
+            <a:off x="2000232" y="4143380"/>
+            <a:ext cx="3143272" cy="253916"/>
+          </a:xfrm>
+          <a:prstGeom prst="rect">
+            <a:avLst/>
+          </a:prstGeom>
+          <a:noFill/>
+        </p:spPr>
+        <p:txBody>
+          <a:bodyPr wrap="square" rtlCol="0">
+            <a:spAutoFit/>
+          </a:bodyPr>
+          <a:lstStyle/>
+          <a:p>
+            <a:r>
+              <a:rPr lang="fr-FR" sz="1050" dirty="0" err="1" smtClean="0"/>
+              <a:t>Hex</a:t>
+            </a:r>
+            <a:r>
+              <a:rPr lang="fr-FR" sz="1050" dirty="0" smtClean="0"/>
+              <a:t> : 2C5D63</a:t>
+            </a:r>
+            <a:endParaRPr lang="fr-FR" sz="1050" dirty="0"/>
+          </a:p>
+        </p:txBody>
+      </p:sp>
+      <p:sp>
+        <p:nvSpPr>
+          <p:cNvPr id="14" name="ZoneTexte 13"/>
+          <p:cNvSpPr txBox="1"/>
+          <p:nvPr/>
+        </p:nvSpPr>
+        <p:spPr>
+          <a:xfrm>
+            <a:off x="571472" y="857232"/>
+            <a:ext cx="5715040" cy="307777"/>
+          </a:xfrm>
+          <a:prstGeom prst="rect">
+            <a:avLst/>
+          </a:prstGeom>
+          <a:noFill/>
+        </p:spPr>
+        <p:txBody>
+          <a:bodyPr wrap="square" rtlCol="0">
+            <a:spAutoFit/>
+          </a:bodyPr>
+          <a:lstStyle/>
+          <a:p>
+            <a:r>
+              <a:rPr lang="fr-FR" sz="1400" b="1" dirty="0" smtClean="0"/>
+              <a:t>Template </a:t>
+            </a:r>
+            <a:r>
+              <a:rPr lang="fr-FR" sz="1400" b="1" dirty="0" smtClean="0"/>
+              <a:t>Thème vert:</a:t>
+            </a:r>
+            <a:endParaRPr lang="fr-FR" sz="1400" b="1" dirty="0"/>
+          </a:p>
+        </p:txBody>
+      </p:sp>
+      <p:sp>
+        <p:nvSpPr>
+          <p:cNvPr id="15" name="Rectangle 14"/>
+          <p:cNvSpPr/>
+          <p:nvPr/>
+        </p:nvSpPr>
+        <p:spPr>
+          <a:xfrm>
+            <a:off x="1071538" y="4714884"/>
+            <a:ext cx="642942" cy="500066"/>
+          </a:xfrm>
+          <a:prstGeom prst="rect">
+            <a:avLst/>
+          </a:prstGeom>
+          <a:solidFill>
+            <a:srgbClr val="28373A"/>
+          </a:solidFill>
+          <a:ln/>
+        </p:spPr>
+        <p:style>
+          <a:lnRef idx="2">
+            <a:schemeClr val="dk1"/>
+          </a:lnRef>
+          <a:fillRef idx="1">
+            <a:schemeClr val="lt1"/>
+          </a:fillRef>
+          <a:effectRef idx="0">
+            <a:schemeClr val="dk1"/>
+          </a:effectRef>
+          <a:fontRef idx="minor">
+            <a:schemeClr val="dk1"/>
+          </a:fontRef>
+        </p:style>
+        <p:txBody>
+          <a:bodyPr rtlCol="0" anchor="ctr"/>
+          <a:lstStyle/>
+          <a:p>
+            <a:pPr algn="ctr"/>
+            <a:endParaRPr lang="fr-FR" dirty="0"/>
+          </a:p>
+        </p:txBody>
+      </p:sp>
+      <p:sp>
+        <p:nvSpPr>
+          <p:cNvPr id="16" name="ZoneTexte 15"/>
+          <p:cNvSpPr txBox="1"/>
+          <p:nvPr/>
+        </p:nvSpPr>
+        <p:spPr>
+          <a:xfrm>
+            <a:off x="1714480" y="4714884"/>
+            <a:ext cx="3143272" cy="307777"/>
+          </a:xfrm>
+          <a:prstGeom prst="rect">
+            <a:avLst/>
+          </a:prstGeom>
+          <a:noFill/>
+        </p:spPr>
+        <p:txBody>
+          <a:bodyPr wrap="square" rtlCol="0">
+            <a:spAutoFit/>
+          </a:bodyPr>
+          <a:lstStyle/>
+          <a:p>
+            <a:r>
+              <a:rPr lang="fr-FR" sz="1400" dirty="0" smtClean="0"/>
+              <a:t>Couleur 2éme détail:</a:t>
+            </a:r>
+            <a:endParaRPr lang="fr-FR" sz="1400" dirty="0"/>
+          </a:p>
+        </p:txBody>
+      </p:sp>
+      <p:sp>
+        <p:nvSpPr>
+          <p:cNvPr id="17" name="ZoneTexte 16"/>
+          <p:cNvSpPr txBox="1"/>
+          <p:nvPr/>
+        </p:nvSpPr>
+        <p:spPr>
+          <a:xfrm>
+            <a:off x="2000232" y="5000636"/>
+            <a:ext cx="3143272" cy="253916"/>
+          </a:xfrm>
+          <a:prstGeom prst="rect">
+            <a:avLst/>
+          </a:prstGeom>
+          <a:noFill/>
+        </p:spPr>
+        <p:txBody>
+          <a:bodyPr wrap="square" rtlCol="0">
+            <a:spAutoFit/>
+          </a:bodyPr>
+          <a:lstStyle/>
+          <a:p>
+            <a:r>
+              <a:rPr lang="fr-FR" sz="1050" dirty="0" err="1" smtClean="0"/>
+              <a:t>Hex</a:t>
+            </a:r>
+            <a:r>
+              <a:rPr lang="fr-FR" sz="1050" dirty="0" smtClean="0"/>
+              <a:t> : 283739</a:t>
+            </a:r>
+            <a:endParaRPr lang="fr-FR" sz="1050" dirty="0"/>
           </a:p>
         </p:txBody>
       </p:sp>

</xml_diff>